<commit_message>
Updated final version background
</commit_message>
<xml_diff>
--- a/background/template.pptx
+++ b/background/template.pptx
@@ -5,10 +5,8 @@
     <p:sldMasterId id="2147483648" r:id="rId1"/>
   </p:sldMasterIdLst>
   <p:sldIdLst>
-    <p:sldId id="257" r:id="rId2"/>
-    <p:sldId id="259" r:id="rId3"/>
-    <p:sldId id="258" r:id="rId4"/>
-    <p:sldId id="261" r:id="rId5"/>
+    <p:sldId id="258" r:id="rId2"/>
+    <p:sldId id="261" r:id="rId3"/>
   </p:sldIdLst>
   <p:sldSz cx="12192000" cy="6858000"/>
   <p:notesSz cx="6858000" cy="9144000"/>
@@ -115,6 +113,160 @@
 </p:presentation>
 </file>
 
+<file path=ppt/revisionInfo.xml><?xml version="1.0" encoding="utf-8"?>
+<p1510:revInfo xmlns:a="http://schemas.openxmlformats.org/drawingml/2006/main" xmlns:r="http://schemas.openxmlformats.org/officeDocument/2006/relationships" xmlns:p1510="http://schemas.microsoft.com/office/powerpoint/2015/10/main">
+  <p1510:revLst>
+    <p1510:client id="{17577F0F-6A3F-FF4A-A562-596839140BD6}" v="3" dt="2023-01-10T18:21:12.895"/>
+  </p1510:revLst>
+</p1510:revInfo>
+</file>
+
+<file path=ppt/changesInfos/changesInfo1.xml><?xml version="1.0" encoding="utf-8"?>
+<pc:chgInfo xmlns:a="http://schemas.openxmlformats.org/drawingml/2006/main" xmlns:r="http://schemas.openxmlformats.org/officeDocument/2006/relationships" xmlns:ac="http://schemas.microsoft.com/office/drawing/2013/main/command" xmlns:pc="http://schemas.microsoft.com/office/powerpoint/2013/main/command">
+  <pc:docChgLst>
+    <pc:chgData name="Marcos Caballero Yus" userId="2f2d1735-a914-4494-9ba4-76a69eafc430" providerId="ADAL" clId="{17577F0F-6A3F-FF4A-A562-596839140BD6}"/>
+    <pc:docChg chg="custSel delSld modSld">
+      <pc:chgData name="Marcos Caballero Yus" userId="2f2d1735-a914-4494-9ba4-76a69eafc430" providerId="ADAL" clId="{17577F0F-6A3F-FF4A-A562-596839140BD6}" dt="2023-01-10T19:08:27.196" v="114" actId="2696"/>
+      <pc:docMkLst>
+        <pc:docMk/>
+      </pc:docMkLst>
+      <pc:sldChg chg="modSp del mod">
+        <pc:chgData name="Marcos Caballero Yus" userId="2f2d1735-a914-4494-9ba4-76a69eafc430" providerId="ADAL" clId="{17577F0F-6A3F-FF4A-A562-596839140BD6}" dt="2023-01-10T19:08:25.834" v="113" actId="2696"/>
+        <pc:sldMkLst>
+          <pc:docMk/>
+          <pc:sldMk cId="338250567" sldId="257"/>
+        </pc:sldMkLst>
+        <pc:spChg chg="mod">
+          <ac:chgData name="Marcos Caballero Yus" userId="2f2d1735-a914-4494-9ba4-76a69eafc430" providerId="ADAL" clId="{17577F0F-6A3F-FF4A-A562-596839140BD6}" dt="2023-01-10T18:18:16.356" v="10" actId="20577"/>
+          <ac:spMkLst>
+            <pc:docMk/>
+            <pc:sldMk cId="338250567" sldId="257"/>
+            <ac:spMk id="2" creationId="{D6CEE3BC-0FA4-476B-ADDB-083D4277EA5A}"/>
+          </ac:spMkLst>
+        </pc:spChg>
+      </pc:sldChg>
+      <pc:sldChg chg="modSp mod">
+        <pc:chgData name="Marcos Caballero Yus" userId="2f2d1735-a914-4494-9ba4-76a69eafc430" providerId="ADAL" clId="{17577F0F-6A3F-FF4A-A562-596839140BD6}" dt="2023-01-10T18:20:21.028" v="48" actId="20577"/>
+        <pc:sldMkLst>
+          <pc:docMk/>
+          <pc:sldMk cId="2921291968" sldId="258"/>
+        </pc:sldMkLst>
+        <pc:spChg chg="mod">
+          <ac:chgData name="Marcos Caballero Yus" userId="2f2d1735-a914-4494-9ba4-76a69eafc430" providerId="ADAL" clId="{17577F0F-6A3F-FF4A-A562-596839140BD6}" dt="2023-01-10T18:20:21.028" v="48" actId="20577"/>
+          <ac:spMkLst>
+            <pc:docMk/>
+            <pc:sldMk cId="2921291968" sldId="258"/>
+            <ac:spMk id="2" creationId="{D6CEE3BC-0FA4-476B-ADDB-083D4277EA5A}"/>
+          </ac:spMkLst>
+        </pc:spChg>
+      </pc:sldChg>
+      <pc:sldChg chg="modSp del mod">
+        <pc:chgData name="Marcos Caballero Yus" userId="2f2d1735-a914-4494-9ba4-76a69eafc430" providerId="ADAL" clId="{17577F0F-6A3F-FF4A-A562-596839140BD6}" dt="2023-01-10T19:08:27.196" v="114" actId="2696"/>
+        <pc:sldMkLst>
+          <pc:docMk/>
+          <pc:sldMk cId="610371235" sldId="259"/>
+        </pc:sldMkLst>
+        <pc:spChg chg="mod">
+          <ac:chgData name="Marcos Caballero Yus" userId="2f2d1735-a914-4494-9ba4-76a69eafc430" providerId="ADAL" clId="{17577F0F-6A3F-FF4A-A562-596839140BD6}" dt="2023-01-10T18:18:45.555" v="29" actId="1076"/>
+          <ac:spMkLst>
+            <pc:docMk/>
+            <pc:sldMk cId="610371235" sldId="259"/>
+            <ac:spMk id="2" creationId="{D6CEE3BC-0FA4-476B-ADDB-083D4277EA5A}"/>
+          </ac:spMkLst>
+        </pc:spChg>
+      </pc:sldChg>
+      <pc:sldChg chg="addSp delSp modSp mod">
+        <pc:chgData name="Marcos Caballero Yus" userId="2f2d1735-a914-4494-9ba4-76a69eafc430" providerId="ADAL" clId="{17577F0F-6A3F-FF4A-A562-596839140BD6}" dt="2023-01-10T19:08:13.777" v="112" actId="14100"/>
+        <pc:sldMkLst>
+          <pc:docMk/>
+          <pc:sldMk cId="1749737363" sldId="261"/>
+        </pc:sldMkLst>
+        <pc:spChg chg="mod">
+          <ac:chgData name="Marcos Caballero Yus" userId="2f2d1735-a914-4494-9ba4-76a69eafc430" providerId="ADAL" clId="{17577F0F-6A3F-FF4A-A562-596839140BD6}" dt="2023-01-10T18:20:27.294" v="66" actId="20577"/>
+          <ac:spMkLst>
+            <pc:docMk/>
+            <pc:sldMk cId="1749737363" sldId="261"/>
+            <ac:spMk id="2" creationId="{D6CEE3BC-0FA4-476B-ADDB-083D4277EA5A}"/>
+          </ac:spMkLst>
+        </pc:spChg>
+        <pc:spChg chg="add mod">
+          <ac:chgData name="Marcos Caballero Yus" userId="2f2d1735-a914-4494-9ba4-76a69eafc430" providerId="ADAL" clId="{17577F0F-6A3F-FF4A-A562-596839140BD6}" dt="2023-01-10T19:06:54.509" v="102" actId="14100"/>
+          <ac:spMkLst>
+            <pc:docMk/>
+            <pc:sldMk cId="1749737363" sldId="261"/>
+            <ac:spMk id="3" creationId="{68C0E7AB-7F87-D6D1-EB23-E0F628EA850F}"/>
+          </ac:spMkLst>
+        </pc:spChg>
+        <pc:spChg chg="mod">
+          <ac:chgData name="Marcos Caballero Yus" userId="2f2d1735-a914-4494-9ba4-76a69eafc430" providerId="ADAL" clId="{17577F0F-6A3F-FF4A-A562-596839140BD6}" dt="2023-01-10T19:08:00.428" v="109" actId="1076"/>
+          <ac:spMkLst>
+            <pc:docMk/>
+            <pc:sldMk cId="1749737363" sldId="261"/>
+            <ac:spMk id="5" creationId="{E3462CE3-2459-4615-9A26-BE8680C5B76D}"/>
+          </ac:spMkLst>
+        </pc:spChg>
+        <pc:spChg chg="add mod">
+          <ac:chgData name="Marcos Caballero Yus" userId="2f2d1735-a914-4494-9ba4-76a69eafc430" providerId="ADAL" clId="{17577F0F-6A3F-FF4A-A562-596839140BD6}" dt="2023-01-10T19:07:49.310" v="108" actId="1076"/>
+          <ac:spMkLst>
+            <pc:docMk/>
+            <pc:sldMk cId="1749737363" sldId="261"/>
+            <ac:spMk id="6" creationId="{2AC60331-DC11-DB6E-8FED-4FBDA7595391}"/>
+          </ac:spMkLst>
+        </pc:spChg>
+        <pc:spChg chg="mod">
+          <ac:chgData name="Marcos Caballero Yus" userId="2f2d1735-a914-4494-9ba4-76a69eafc430" providerId="ADAL" clId="{17577F0F-6A3F-FF4A-A562-596839140BD6}" dt="2023-01-10T19:07:07.994" v="103" actId="14100"/>
+          <ac:spMkLst>
+            <pc:docMk/>
+            <pc:sldMk cId="1749737363" sldId="261"/>
+            <ac:spMk id="7" creationId="{D27DD9B1-2189-435B-B411-220C58C6CF08}"/>
+          </ac:spMkLst>
+        </pc:spChg>
+        <pc:spChg chg="mod">
+          <ac:chgData name="Marcos Caballero Yus" userId="2f2d1735-a914-4494-9ba4-76a69eafc430" providerId="ADAL" clId="{17577F0F-6A3F-FF4A-A562-596839140BD6}" dt="2023-01-10T19:07:19.861" v="105" actId="14100"/>
+          <ac:spMkLst>
+            <pc:docMk/>
+            <pc:sldMk cId="1749737363" sldId="261"/>
+            <ac:spMk id="8" creationId="{BCB273F6-D7A6-427F-AA82-E0049A7D0C8B}"/>
+          </ac:spMkLst>
+        </pc:spChg>
+        <pc:spChg chg="add mod">
+          <ac:chgData name="Marcos Caballero Yus" userId="2f2d1735-a914-4494-9ba4-76a69eafc430" providerId="ADAL" clId="{17577F0F-6A3F-FF4A-A562-596839140BD6}" dt="2023-01-10T19:08:13.777" v="112" actId="14100"/>
+          <ac:spMkLst>
+            <pc:docMk/>
+            <pc:sldMk cId="1749737363" sldId="261"/>
+            <ac:spMk id="9" creationId="{9601BE81-879B-0807-496E-6E8C34D1E760}"/>
+          </ac:spMkLst>
+        </pc:spChg>
+        <pc:spChg chg="del mod">
+          <ac:chgData name="Marcos Caballero Yus" userId="2f2d1735-a914-4494-9ba4-76a69eafc430" providerId="ADAL" clId="{17577F0F-6A3F-FF4A-A562-596839140BD6}" dt="2023-01-10T19:06:25.260" v="99" actId="478"/>
+          <ac:spMkLst>
+            <pc:docMk/>
+            <pc:sldMk cId="1749737363" sldId="261"/>
+            <ac:spMk id="12" creationId="{31844B8E-71A6-4C58-B758-27C740BFEF6D}"/>
+          </ac:spMkLst>
+        </pc:spChg>
+        <pc:spChg chg="del">
+          <ac:chgData name="Marcos Caballero Yus" userId="2f2d1735-a914-4494-9ba4-76a69eafc430" providerId="ADAL" clId="{17577F0F-6A3F-FF4A-A562-596839140BD6}" dt="2023-01-10T18:19:52.066" v="37" actId="478"/>
+          <ac:spMkLst>
+            <pc:docMk/>
+            <pc:sldMk cId="1749737363" sldId="261"/>
+            <ac:spMk id="17" creationId="{3FD6F48E-DE54-4F7C-8972-2537AF525580}"/>
+          </ac:spMkLst>
+        </pc:spChg>
+        <pc:spChg chg="del mod">
+          <ac:chgData name="Marcos Caballero Yus" userId="2f2d1735-a914-4494-9ba4-76a69eafc430" providerId="ADAL" clId="{17577F0F-6A3F-FF4A-A562-596839140BD6}" dt="2023-01-10T19:06:14.268" v="97" actId="478"/>
+          <ac:spMkLst>
+            <pc:docMk/>
+            <pc:sldMk cId="1749737363" sldId="261"/>
+            <ac:spMk id="18" creationId="{2DF384E1-0158-4B13-ABA0-76C66C401D0B}"/>
+          </ac:spMkLst>
+        </pc:spChg>
+      </pc:sldChg>
+    </pc:docChg>
+  </pc:docChgLst>
+</pc:chgInfo>
+</file>
+
 <file path=ppt/slideLayouts/slideLayout1.xml><?xml version="1.0" encoding="utf-8"?>
 <p:sldLayout xmlns:a="http://schemas.openxmlformats.org/drawingml/2006/main" xmlns:r="http://schemas.openxmlformats.org/officeDocument/2006/relationships" xmlns:p="http://schemas.openxmlformats.org/presentationml/2006/main" type="title" preserve="1">
   <p:cSld name="Title Slide">
@@ -262,7 +414,7 @@
           <a:p>
             <a:fld id="{AE8A0982-11E0-484D-83EE-92BE45BE0A15}" type="datetimeFigureOut">
               <a:rPr lang="en-US" smtClean="0"/>
-              <a:t>1/9/23</a:t>
+              <a:t>1/10/23</a:t>
             </a:fld>
             <a:endParaRPr lang="en-US"/>
           </a:p>
@@ -460,7 +612,7 @@
           <a:p>
             <a:fld id="{AE8A0982-11E0-484D-83EE-92BE45BE0A15}" type="datetimeFigureOut">
               <a:rPr lang="en-US" smtClean="0"/>
-              <a:t>1/9/23</a:t>
+              <a:t>1/10/23</a:t>
             </a:fld>
             <a:endParaRPr lang="en-US"/>
           </a:p>
@@ -668,7 +820,7 @@
           <a:p>
             <a:fld id="{AE8A0982-11E0-484D-83EE-92BE45BE0A15}" type="datetimeFigureOut">
               <a:rPr lang="en-US" smtClean="0"/>
-              <a:t>1/9/23</a:t>
+              <a:t>1/10/23</a:t>
             </a:fld>
             <a:endParaRPr lang="en-US"/>
           </a:p>
@@ -866,7 +1018,7 @@
           <a:p>
             <a:fld id="{AE8A0982-11E0-484D-83EE-92BE45BE0A15}" type="datetimeFigureOut">
               <a:rPr lang="en-US" smtClean="0"/>
-              <a:t>1/9/23</a:t>
+              <a:t>1/10/23</a:t>
             </a:fld>
             <a:endParaRPr lang="en-US"/>
           </a:p>
@@ -1141,7 +1293,7 @@
           <a:p>
             <a:fld id="{AE8A0982-11E0-484D-83EE-92BE45BE0A15}" type="datetimeFigureOut">
               <a:rPr lang="en-US" smtClean="0"/>
-              <a:t>1/9/23</a:t>
+              <a:t>1/10/23</a:t>
             </a:fld>
             <a:endParaRPr lang="en-US"/>
           </a:p>
@@ -1406,7 +1558,7 @@
           <a:p>
             <a:fld id="{AE8A0982-11E0-484D-83EE-92BE45BE0A15}" type="datetimeFigureOut">
               <a:rPr lang="en-US" smtClean="0"/>
-              <a:t>1/9/23</a:t>
+              <a:t>1/10/23</a:t>
             </a:fld>
             <a:endParaRPr lang="en-US"/>
           </a:p>
@@ -1818,7 +1970,7 @@
           <a:p>
             <a:fld id="{AE8A0982-11E0-484D-83EE-92BE45BE0A15}" type="datetimeFigureOut">
               <a:rPr lang="en-US" smtClean="0"/>
-              <a:t>1/9/23</a:t>
+              <a:t>1/10/23</a:t>
             </a:fld>
             <a:endParaRPr lang="en-US"/>
           </a:p>
@@ -1959,7 +2111,7 @@
           <a:p>
             <a:fld id="{AE8A0982-11E0-484D-83EE-92BE45BE0A15}" type="datetimeFigureOut">
               <a:rPr lang="en-US" smtClean="0"/>
-              <a:t>1/9/23</a:t>
+              <a:t>1/10/23</a:t>
             </a:fld>
             <a:endParaRPr lang="en-US"/>
           </a:p>
@@ -2072,7 +2224,7 @@
           <a:p>
             <a:fld id="{AE8A0982-11E0-484D-83EE-92BE45BE0A15}" type="datetimeFigureOut">
               <a:rPr lang="en-US" smtClean="0"/>
-              <a:t>1/9/23</a:t>
+              <a:t>1/10/23</a:t>
             </a:fld>
             <a:endParaRPr lang="en-US"/>
           </a:p>
@@ -2383,7 +2535,7 @@
           <a:p>
             <a:fld id="{AE8A0982-11E0-484D-83EE-92BE45BE0A15}" type="datetimeFigureOut">
               <a:rPr lang="en-US" smtClean="0"/>
-              <a:t>1/9/23</a:t>
+              <a:t>1/10/23</a:t>
             </a:fld>
             <a:endParaRPr lang="en-US"/>
           </a:p>
@@ -2671,7 +2823,7 @@
           <a:p>
             <a:fld id="{AE8A0982-11E0-484D-83EE-92BE45BE0A15}" type="datetimeFigureOut">
               <a:rPr lang="en-US" smtClean="0"/>
-              <a:t>1/9/23</a:t>
+              <a:t>1/10/23</a:t>
             </a:fld>
             <a:endParaRPr lang="en-US"/>
           </a:p>
@@ -2912,7 +3064,7 @@
           <a:p>
             <a:fld id="{AE8A0982-11E0-484D-83EE-92BE45BE0A15}" type="datetimeFigureOut">
               <a:rPr lang="en-US" smtClean="0"/>
-              <a:t>1/9/23</a:t>
+              <a:t>1/10/23</a:t>
             </a:fld>
             <a:endParaRPr lang="en-US"/>
           </a:p>
@@ -3354,7 +3506,7 @@
         </p:nvSpPr>
         <p:spPr>
           <a:xfrm>
-            <a:off x="3653683" y="659115"/>
+            <a:off x="3653683" y="650238"/>
             <a:ext cx="4884633" cy="679476"/>
           </a:xfrm>
           <a:prstGeom prst="rect">
@@ -3388,6 +3540,168 @@
       </p:sp>
       <p:sp>
         <p:nvSpPr>
+          <p:cNvPr id="5" name="Rectangle: Rounded Corners 4">
+            <a:extLst>
+              <a:ext uri="{FF2B5EF4-FFF2-40B4-BE49-F238E27FC236}">
+                <a16:creationId xmlns:a16="http://schemas.microsoft.com/office/drawing/2014/main" id="{E3462CE3-2459-4615-9A26-BE8680C5B76D}"/>
+              </a:ext>
+            </a:extLst>
+          </p:cNvPr>
+          <p:cNvSpPr/>
+          <p:nvPr/>
+        </p:nvSpPr>
+        <p:spPr>
+          <a:xfrm>
+            <a:off x="408435" y="148202"/>
+            <a:ext cx="1139351" cy="1293480"/>
+          </a:xfrm>
+          <a:prstGeom prst="roundRect">
+            <a:avLst>
+              <a:gd name="adj" fmla="val 3639"/>
+            </a:avLst>
+          </a:prstGeom>
+          <a:noFill/>
+          <a:ln w="19050">
+            <a:solidFill>
+              <a:srgbClr val="C00000"/>
+            </a:solidFill>
+          </a:ln>
+        </p:spPr>
+        <p:style>
+          <a:lnRef idx="2">
+            <a:schemeClr val="accent1">
+              <a:shade val="50000"/>
+            </a:schemeClr>
+          </a:lnRef>
+          <a:fillRef idx="1">
+            <a:schemeClr val="accent1"/>
+          </a:fillRef>
+          <a:effectRef idx="0">
+            <a:schemeClr val="accent1"/>
+          </a:effectRef>
+          <a:fontRef idx="minor">
+            <a:schemeClr val="lt1"/>
+          </a:fontRef>
+        </p:style>
+        <p:txBody>
+          <a:bodyPr rtlCol="0" anchor="ctr"/>
+          <a:lstStyle/>
+          <a:p>
+            <a:pPr algn="ctr"/>
+            <a:endParaRPr lang="en-US"/>
+          </a:p>
+        </p:txBody>
+      </p:sp>
+      <p:sp>
+        <p:nvSpPr>
+          <p:cNvPr id="7" name="Rectangle: Rounded Corners 6">
+            <a:extLst>
+              <a:ext uri="{FF2B5EF4-FFF2-40B4-BE49-F238E27FC236}">
+                <a16:creationId xmlns:a16="http://schemas.microsoft.com/office/drawing/2014/main" id="{D27DD9B1-2189-435B-B411-220C58C6CF08}"/>
+              </a:ext>
+            </a:extLst>
+          </p:cNvPr>
+          <p:cNvSpPr/>
+          <p:nvPr/>
+        </p:nvSpPr>
+        <p:spPr>
+          <a:xfrm>
+            <a:off x="408441" y="4525204"/>
+            <a:ext cx="4885012" cy="2184594"/>
+          </a:xfrm>
+          <a:prstGeom prst="roundRect">
+            <a:avLst>
+              <a:gd name="adj" fmla="val 6119"/>
+            </a:avLst>
+          </a:prstGeom>
+          <a:noFill/>
+          <a:ln w="19050">
+            <a:solidFill>
+              <a:srgbClr val="C00000"/>
+            </a:solidFill>
+          </a:ln>
+        </p:spPr>
+        <p:style>
+          <a:lnRef idx="2">
+            <a:schemeClr val="accent1">
+              <a:shade val="50000"/>
+            </a:schemeClr>
+          </a:lnRef>
+          <a:fillRef idx="1">
+            <a:schemeClr val="accent1"/>
+          </a:fillRef>
+          <a:effectRef idx="0">
+            <a:schemeClr val="accent1"/>
+          </a:effectRef>
+          <a:fontRef idx="minor">
+            <a:schemeClr val="lt1"/>
+          </a:fontRef>
+        </p:style>
+        <p:txBody>
+          <a:bodyPr rtlCol="0" anchor="ctr"/>
+          <a:lstStyle/>
+          <a:p>
+            <a:pPr algn="ctr"/>
+            <a:endParaRPr lang="en-US"/>
+          </a:p>
+        </p:txBody>
+      </p:sp>
+      <p:sp>
+        <p:nvSpPr>
+          <p:cNvPr id="8" name="Rectangle: Rounded Corners 7">
+            <a:extLst>
+              <a:ext uri="{FF2B5EF4-FFF2-40B4-BE49-F238E27FC236}">
+                <a16:creationId xmlns:a16="http://schemas.microsoft.com/office/drawing/2014/main" id="{BCB273F6-D7A6-427F-AA82-E0049A7D0C8B}"/>
+              </a:ext>
+            </a:extLst>
+          </p:cNvPr>
+          <p:cNvSpPr/>
+          <p:nvPr/>
+        </p:nvSpPr>
+        <p:spPr>
+          <a:xfrm>
+            <a:off x="5444455" y="4519292"/>
+            <a:ext cx="6442746" cy="2184594"/>
+          </a:xfrm>
+          <a:prstGeom prst="roundRect">
+            <a:avLst>
+              <a:gd name="adj" fmla="val 3639"/>
+            </a:avLst>
+          </a:prstGeom>
+          <a:noFill/>
+          <a:ln w="19050">
+            <a:solidFill>
+              <a:srgbClr val="C00000"/>
+            </a:solidFill>
+          </a:ln>
+        </p:spPr>
+        <p:style>
+          <a:lnRef idx="2">
+            <a:schemeClr val="accent1">
+              <a:shade val="50000"/>
+            </a:schemeClr>
+          </a:lnRef>
+          <a:fillRef idx="1">
+            <a:schemeClr val="accent1"/>
+          </a:fillRef>
+          <a:effectRef idx="0">
+            <a:schemeClr val="accent1"/>
+          </a:effectRef>
+          <a:fontRef idx="minor">
+            <a:schemeClr val="lt1"/>
+          </a:fontRef>
+        </p:style>
+        <p:txBody>
+          <a:bodyPr rtlCol="0" anchor="ctr"/>
+          <a:lstStyle/>
+          <a:p>
+            <a:pPr algn="ctr"/>
+            <a:endParaRPr lang="en-US"/>
+          </a:p>
+        </p:txBody>
+      </p:sp>
+      <p:sp>
+        <p:nvSpPr>
           <p:cNvPr id="2" name="TextBox 1">
             <a:extLst>
               <a:ext uri="{FF2B5EF4-FFF2-40B4-BE49-F238E27FC236}">
@@ -3400,8 +3714,8 @@
         </p:nvSpPr>
         <p:spPr>
           <a:xfrm>
-            <a:off x="5526323" y="220919"/>
-            <a:ext cx="1297150" cy="369332"/>
+            <a:off x="5444455" y="224923"/>
+            <a:ext cx="1096775" cy="369332"/>
           </a:xfrm>
           <a:prstGeom prst="rect">
             <a:avLst/>
@@ -3415,30 +3729,183 @@
           <a:lstStyle/>
           <a:p>
             <a:r>
-              <a:rPr lang="en-US" dirty="0" err="1">
-                <a:solidFill>
-                  <a:schemeClr val="bg1"/>
-                </a:solidFill>
-                <a:latin typeface="Bebas Neue" panose="020B0606020202050201" pitchFamily="34" charset="0"/>
-              </a:rPr>
-              <a:t>Visión</a:t>
-            </a:r>
-            <a:r>
               <a:rPr lang="en-US" dirty="0">
                 <a:solidFill>
                   <a:schemeClr val="bg1"/>
                 </a:solidFill>
                 <a:latin typeface="Bebas Neue" panose="020B0606020202050201" pitchFamily="34" charset="0"/>
               </a:rPr>
-              <a:t> general</a:t>
-            </a:r>
+              <a:t>OVERVIEW OF</a:t>
+            </a:r>
+          </a:p>
+        </p:txBody>
+      </p:sp>
+      <p:sp>
+        <p:nvSpPr>
+          <p:cNvPr id="12" name="Rectangle: Rounded Corners 11">
+            <a:extLst>
+              <a:ext uri="{FF2B5EF4-FFF2-40B4-BE49-F238E27FC236}">
+                <a16:creationId xmlns:a16="http://schemas.microsoft.com/office/drawing/2014/main" id="{31844B8E-71A6-4C58-B758-27C740BFEF6D}"/>
+              </a:ext>
+            </a:extLst>
+          </p:cNvPr>
+          <p:cNvSpPr/>
+          <p:nvPr/>
+        </p:nvSpPr>
+        <p:spPr>
+          <a:xfrm>
+            <a:off x="408435" y="1610687"/>
+            <a:ext cx="11478766" cy="2796638"/>
+          </a:xfrm>
+          <a:prstGeom prst="roundRect">
+            <a:avLst>
+              <a:gd name="adj" fmla="val 6119"/>
+            </a:avLst>
+          </a:prstGeom>
+          <a:noFill/>
+          <a:ln w="19050">
+            <a:solidFill>
+              <a:srgbClr val="C00000"/>
+            </a:solidFill>
+          </a:ln>
+        </p:spPr>
+        <p:style>
+          <a:lnRef idx="2">
+            <a:schemeClr val="accent1">
+              <a:shade val="50000"/>
+            </a:schemeClr>
+          </a:lnRef>
+          <a:fillRef idx="1">
+            <a:schemeClr val="accent1"/>
+          </a:fillRef>
+          <a:effectRef idx="0">
+            <a:schemeClr val="accent1"/>
+          </a:effectRef>
+          <a:fontRef idx="minor">
+            <a:schemeClr val="lt1"/>
+          </a:fontRef>
+        </p:style>
+        <p:txBody>
+          <a:bodyPr rtlCol="0" anchor="ctr"/>
+          <a:lstStyle/>
+          <a:p>
+            <a:pPr algn="ctr"/>
+            <a:endParaRPr lang="en-US" dirty="0"/>
+          </a:p>
+        </p:txBody>
+      </p:sp>
+      <p:sp>
+        <p:nvSpPr>
+          <p:cNvPr id="17" name="Rectangle: Rounded Corners 16">
+            <a:extLst>
+              <a:ext uri="{FF2B5EF4-FFF2-40B4-BE49-F238E27FC236}">
+                <a16:creationId xmlns:a16="http://schemas.microsoft.com/office/drawing/2014/main" id="{3FD6F48E-DE54-4F7C-8972-2537AF525580}"/>
+              </a:ext>
+            </a:extLst>
+          </p:cNvPr>
+          <p:cNvSpPr/>
+          <p:nvPr/>
+        </p:nvSpPr>
+        <p:spPr>
+          <a:xfrm>
+            <a:off x="9224618" y="212042"/>
+            <a:ext cx="2533031" cy="1229640"/>
+          </a:xfrm>
+          <a:prstGeom prst="roundRect">
+            <a:avLst>
+              <a:gd name="adj" fmla="val 3639"/>
+            </a:avLst>
+          </a:prstGeom>
+          <a:noFill/>
+          <a:ln w="19050">
+            <a:solidFill>
+              <a:srgbClr val="C00000"/>
+            </a:solidFill>
+          </a:ln>
+        </p:spPr>
+        <p:style>
+          <a:lnRef idx="2">
+            <a:schemeClr val="accent1">
+              <a:shade val="50000"/>
+            </a:schemeClr>
+          </a:lnRef>
+          <a:fillRef idx="1">
+            <a:schemeClr val="accent1"/>
+          </a:fillRef>
+          <a:effectRef idx="0">
+            <a:schemeClr val="accent1"/>
+          </a:effectRef>
+          <a:fontRef idx="minor">
+            <a:schemeClr val="lt1"/>
+          </a:fontRef>
+        </p:style>
+        <p:txBody>
+          <a:bodyPr rtlCol="0" anchor="ctr"/>
+          <a:lstStyle/>
+          <a:p>
+            <a:pPr algn="ctr"/>
+            <a:endParaRPr lang="en-US"/>
+          </a:p>
+        </p:txBody>
+      </p:sp>
+      <p:sp>
+        <p:nvSpPr>
+          <p:cNvPr id="18" name="Rectangle: Rounded Corners 17">
+            <a:extLst>
+              <a:ext uri="{FF2B5EF4-FFF2-40B4-BE49-F238E27FC236}">
+                <a16:creationId xmlns:a16="http://schemas.microsoft.com/office/drawing/2014/main" id="{2DF384E1-0158-4B13-ABA0-76C66C401D0B}"/>
+              </a:ext>
+            </a:extLst>
+          </p:cNvPr>
+          <p:cNvSpPr/>
+          <p:nvPr/>
+        </p:nvSpPr>
+        <p:spPr>
+          <a:xfrm>
+            <a:off x="1828028" y="212042"/>
+            <a:ext cx="1139351" cy="1229640"/>
+          </a:xfrm>
+          <a:prstGeom prst="roundRect">
+            <a:avLst>
+              <a:gd name="adj" fmla="val 3639"/>
+            </a:avLst>
+          </a:prstGeom>
+          <a:noFill/>
+          <a:ln w="19050">
+            <a:solidFill>
+              <a:srgbClr val="C00000"/>
+            </a:solidFill>
+          </a:ln>
+        </p:spPr>
+        <p:style>
+          <a:lnRef idx="2">
+            <a:schemeClr val="accent1">
+              <a:shade val="50000"/>
+            </a:schemeClr>
+          </a:lnRef>
+          <a:fillRef idx="1">
+            <a:schemeClr val="accent1"/>
+          </a:fillRef>
+          <a:effectRef idx="0">
+            <a:schemeClr val="accent1"/>
+          </a:effectRef>
+          <a:fontRef idx="minor">
+            <a:schemeClr val="lt1"/>
+          </a:fontRef>
+        </p:style>
+        <p:txBody>
+          <a:bodyPr rtlCol="0" anchor="ctr"/>
+          <a:lstStyle/>
+          <a:p>
+            <a:pPr algn="ctr"/>
+            <a:endParaRPr lang="en-US"/>
           </a:p>
         </p:txBody>
       </p:sp>
     </p:spTree>
     <p:extLst>
       <p:ext uri="{BB962C8B-B14F-4D97-AF65-F5344CB8AC3E}">
-        <p14:creationId xmlns:p14="http://schemas.microsoft.com/office/powerpoint/2010/main" val="338250567"/>
+        <p14:creationId xmlns:p14="http://schemas.microsoft.com/office/powerpoint/2010/main" val="2921291968"/>
       </p:ext>
     </p:extLst>
   </p:cSld>
@@ -3490,7 +3957,7 @@
         </p:nvSpPr>
         <p:spPr>
           <a:xfrm>
-            <a:off x="3653683" y="659115"/>
+            <a:off x="3653683" y="650238"/>
             <a:ext cx="4884633" cy="679476"/>
           </a:xfrm>
           <a:prstGeom prst="rect">
@@ -3524,156 +3991,20 @@
       </p:sp>
       <p:sp>
         <p:nvSpPr>
-          <p:cNvPr id="2" name="TextBox 1">
-            <a:extLst>
-              <a:ext uri="{FF2B5EF4-FFF2-40B4-BE49-F238E27FC236}">
-                <a16:creationId xmlns:a16="http://schemas.microsoft.com/office/drawing/2014/main" id="{D6CEE3BC-0FA4-476B-ADDB-083D4277EA5A}"/>
-              </a:ext>
-            </a:extLst>
-          </p:cNvPr>
-          <p:cNvSpPr txBox="1"/>
+          <p:cNvPr id="5" name="Rectangle: Rounded Corners 4">
+            <a:extLst>
+              <a:ext uri="{FF2B5EF4-FFF2-40B4-BE49-F238E27FC236}">
+                <a16:creationId xmlns:a16="http://schemas.microsoft.com/office/drawing/2014/main" id="{E3462CE3-2459-4615-9A26-BE8680C5B76D}"/>
+              </a:ext>
+            </a:extLst>
+          </p:cNvPr>
+          <p:cNvSpPr/>
           <p:nvPr/>
         </p:nvSpPr>
         <p:spPr>
           <a:xfrm>
-            <a:off x="5283116" y="229308"/>
-            <a:ext cx="1617751" cy="369332"/>
-          </a:xfrm>
-          <a:prstGeom prst="rect">
-            <a:avLst/>
-          </a:prstGeom>
-          <a:noFill/>
-        </p:spPr>
-        <p:txBody>
-          <a:bodyPr wrap="none" rtlCol="0">
-            <a:spAutoFit/>
-          </a:bodyPr>
-          <a:lstStyle/>
-          <a:p>
-            <a:r>
-              <a:rPr lang="en-US" dirty="0" err="1">
-                <a:solidFill>
-                  <a:schemeClr val="bg1"/>
-                </a:solidFill>
-                <a:latin typeface="Bebas Neue" panose="020B0606020202050201" pitchFamily="34" charset="0"/>
-              </a:rPr>
-              <a:t>Películas</a:t>
-            </a:r>
-            <a:r>
-              <a:rPr lang="en-US" dirty="0">
-                <a:solidFill>
-                  <a:schemeClr val="bg1"/>
-                </a:solidFill>
-                <a:latin typeface="Bebas Neue" panose="020B0606020202050201" pitchFamily="34" charset="0"/>
-              </a:rPr>
-              <a:t> top IMDB</a:t>
-            </a:r>
-          </a:p>
-        </p:txBody>
-      </p:sp>
-    </p:spTree>
-    <p:extLst>
-      <p:ext uri="{BB962C8B-B14F-4D97-AF65-F5344CB8AC3E}">
-        <p14:creationId xmlns:p14="http://schemas.microsoft.com/office/powerpoint/2010/main" val="610371235"/>
-      </p:ext>
-    </p:extLst>
-  </p:cSld>
-  <p:clrMapOvr>
-    <a:masterClrMapping/>
-  </p:clrMapOvr>
-</p:sld>
-</file>
-
-<file path=ppt/slides/slide3.xml><?xml version="1.0" encoding="utf-8"?>
-<p:sld xmlns:a="http://schemas.openxmlformats.org/drawingml/2006/main" xmlns:r="http://schemas.openxmlformats.org/officeDocument/2006/relationships" xmlns:p="http://schemas.openxmlformats.org/presentationml/2006/main">
-  <p:cSld>
-    <p:bg>
-      <p:bgPr>
-        <a:solidFill>
-          <a:schemeClr val="tx1">
-            <a:lumMod val="85000"/>
-            <a:lumOff val="15000"/>
-          </a:schemeClr>
-        </a:solidFill>
-        <a:effectLst/>
-      </p:bgPr>
-    </p:bg>
-    <p:spTree>
-      <p:nvGrpSpPr>
-        <p:cNvPr id="1" name=""/>
-        <p:cNvGrpSpPr/>
-        <p:nvPr/>
-      </p:nvGrpSpPr>
-      <p:grpSpPr>
-        <a:xfrm>
-          <a:off x="0" y="0"/>
-          <a:ext cx="0" cy="0"/>
-          <a:chOff x="0" y="0"/>
-          <a:chExt cx="0" cy="0"/>
-        </a:xfrm>
-      </p:grpSpPr>
-      <p:sp>
-        <p:nvSpPr>
-          <p:cNvPr id="4" name="TextBox 3">
-            <a:extLst>
-              <a:ext uri="{FF2B5EF4-FFF2-40B4-BE49-F238E27FC236}">
-                <a16:creationId xmlns:a16="http://schemas.microsoft.com/office/drawing/2014/main" id="{81607AD8-2865-49DA-9B6C-725094F527FC}"/>
-              </a:ext>
-            </a:extLst>
-          </p:cNvPr>
-          <p:cNvSpPr txBox="1"/>
-          <p:nvPr/>
-        </p:nvSpPr>
-        <p:spPr>
-          <a:xfrm>
-            <a:off x="3653683" y="650238"/>
-            <a:ext cx="4884633" cy="679476"/>
-          </a:xfrm>
-          <a:prstGeom prst="rect">
-            <a:avLst/>
-          </a:prstGeom>
-          <a:noFill/>
-        </p:spPr>
-        <p:txBody>
-          <a:bodyPr wrap="square" rtlCol="0">
-            <a:prstTxWarp prst="textDeflateBottom">
-              <a:avLst>
-                <a:gd name="adj" fmla="val 76247"/>
-              </a:avLst>
-            </a:prstTxWarp>
-            <a:spAutoFit/>
-          </a:bodyPr>
-          <a:lstStyle/>
-          <a:p>
-            <a:pPr algn="ctr"/>
-            <a:r>
-              <a:rPr lang="en-US" sz="3200" dirty="0">
-                <a:solidFill>
-                  <a:srgbClr val="C00000"/>
-                </a:solidFill>
-                <a:latin typeface="Bebas Neue" panose="020B0606020202050201" pitchFamily="34" charset="0"/>
-              </a:rPr>
-              <a:t>Netflix</a:t>
-            </a:r>
-          </a:p>
-        </p:txBody>
-      </p:sp>
-      <p:sp>
-        <p:nvSpPr>
-          <p:cNvPr id="5" name="Rectangle: Rounded Corners 4">
-            <a:extLst>
-              <a:ext uri="{FF2B5EF4-FFF2-40B4-BE49-F238E27FC236}">
-                <a16:creationId xmlns:a16="http://schemas.microsoft.com/office/drawing/2014/main" id="{E3462CE3-2459-4615-9A26-BE8680C5B76D}"/>
-              </a:ext>
-            </a:extLst>
-          </p:cNvPr>
-          <p:cNvSpPr/>
-          <p:nvPr/>
-        </p:nvSpPr>
-        <p:spPr>
-          <a:xfrm>
-            <a:off x="408435" y="148202"/>
-            <a:ext cx="1139351" cy="1293480"/>
+            <a:off x="408435" y="493851"/>
+            <a:ext cx="2558944" cy="496125"/>
           </a:xfrm>
           <a:prstGeom prst="roundRect">
             <a:avLst>
@@ -3726,8 +4057,8 @@
         </p:nvSpPr>
         <p:spPr>
           <a:xfrm>
-            <a:off x="408441" y="4525204"/>
-            <a:ext cx="4885012" cy="2184594"/>
+            <a:off x="408434" y="4023955"/>
+            <a:ext cx="4651246" cy="2596977"/>
           </a:xfrm>
           <a:prstGeom prst="roundRect">
             <a:avLst>
@@ -3780,8 +4111,8 @@
         </p:nvSpPr>
         <p:spPr>
           <a:xfrm>
-            <a:off x="5444455" y="4519292"/>
-            <a:ext cx="6442746" cy="2184594"/>
+            <a:off x="5287123" y="4023954"/>
+            <a:ext cx="6600078" cy="2608665"/>
           </a:xfrm>
           <a:prstGeom prst="roundRect">
             <a:avLst>
@@ -3834,8 +4165,8 @@
         </p:nvSpPr>
         <p:spPr>
           <a:xfrm>
-            <a:off x="5444455" y="224923"/>
-            <a:ext cx="1297150" cy="369332"/>
+            <a:off x="5287123" y="234898"/>
+            <a:ext cx="1625766" cy="369332"/>
           </a:xfrm>
           <a:prstGeom prst="rect">
             <a:avLst/>
@@ -3849,32 +4180,23 @@
           <a:lstStyle/>
           <a:p>
             <a:r>
-              <a:rPr lang="en-US" dirty="0" err="1">
-                <a:solidFill>
-                  <a:schemeClr val="bg1"/>
-                </a:solidFill>
-                <a:latin typeface="Bebas Neue" panose="020B0606020202050201" pitchFamily="34" charset="0"/>
-              </a:rPr>
-              <a:t>Visión</a:t>
-            </a:r>
-            <a:r>
               <a:rPr lang="en-US" dirty="0">
                 <a:solidFill>
                   <a:schemeClr val="bg1"/>
                 </a:solidFill>
                 <a:latin typeface="Bebas Neue" panose="020B0606020202050201" pitchFamily="34" charset="0"/>
               </a:rPr>
-              <a:t> general</a:t>
-            </a:r>
-          </a:p>
-        </p:txBody>
-      </p:sp>
-      <p:sp>
-        <p:nvSpPr>
-          <p:cNvPr id="12" name="Rectangle: Rounded Corners 11">
-            <a:extLst>
-              <a:ext uri="{FF2B5EF4-FFF2-40B4-BE49-F238E27FC236}">
-                <a16:creationId xmlns:a16="http://schemas.microsoft.com/office/drawing/2014/main" id="{31844B8E-71A6-4C58-B758-27C740BFEF6D}"/>
+              <a:t>IMDB TOP MOVIES ON</a:t>
+            </a:r>
+          </a:p>
+        </p:txBody>
+      </p:sp>
+      <p:sp>
+        <p:nvSpPr>
+          <p:cNvPr id="3" name="Rectangle: Rounded Corners 11">
+            <a:extLst>
+              <a:ext uri="{FF2B5EF4-FFF2-40B4-BE49-F238E27FC236}">
+                <a16:creationId xmlns:a16="http://schemas.microsoft.com/office/drawing/2014/main" id="{68C0E7AB-7F87-D6D1-EB23-E0F628EA850F}"/>
               </a:ext>
             </a:extLst>
           </p:cNvPr>
@@ -3883,8 +4205,8 @@
         </p:nvSpPr>
         <p:spPr>
           <a:xfrm>
-            <a:off x="408435" y="1610687"/>
-            <a:ext cx="11478766" cy="2796638"/>
+            <a:off x="3747752" y="1609368"/>
+            <a:ext cx="6595128" cy="2191141"/>
           </a:xfrm>
           <a:prstGeom prst="roundRect">
             <a:avLst>
@@ -3925,10 +4247,10 @@
       </p:sp>
       <p:sp>
         <p:nvSpPr>
-          <p:cNvPr id="17" name="Rectangle: Rounded Corners 16">
-            <a:extLst>
-              <a:ext uri="{FF2B5EF4-FFF2-40B4-BE49-F238E27FC236}">
-                <a16:creationId xmlns:a16="http://schemas.microsoft.com/office/drawing/2014/main" id="{3FD6F48E-DE54-4F7C-8972-2537AF525580}"/>
+          <p:cNvPr id="6" name="Rectangle: Rounded Corners 11">
+            <a:extLst>
+              <a:ext uri="{FF2B5EF4-FFF2-40B4-BE49-F238E27FC236}">
+                <a16:creationId xmlns:a16="http://schemas.microsoft.com/office/drawing/2014/main" id="{2AC60331-DC11-DB6E-8FED-4FBDA7595391}"/>
               </a:ext>
             </a:extLst>
           </p:cNvPr>
@@ -3937,257 +4259,8 @@
         </p:nvSpPr>
         <p:spPr>
           <a:xfrm>
-            <a:off x="9224618" y="212042"/>
-            <a:ext cx="2533031" cy="1229640"/>
-          </a:xfrm>
-          <a:prstGeom prst="roundRect">
-            <a:avLst>
-              <a:gd name="adj" fmla="val 3639"/>
-            </a:avLst>
-          </a:prstGeom>
-          <a:noFill/>
-          <a:ln w="19050">
-            <a:solidFill>
-              <a:srgbClr val="C00000"/>
-            </a:solidFill>
-          </a:ln>
-        </p:spPr>
-        <p:style>
-          <a:lnRef idx="2">
-            <a:schemeClr val="accent1">
-              <a:shade val="50000"/>
-            </a:schemeClr>
-          </a:lnRef>
-          <a:fillRef idx="1">
-            <a:schemeClr val="accent1"/>
-          </a:fillRef>
-          <a:effectRef idx="0">
-            <a:schemeClr val="accent1"/>
-          </a:effectRef>
-          <a:fontRef idx="minor">
-            <a:schemeClr val="lt1"/>
-          </a:fontRef>
-        </p:style>
-        <p:txBody>
-          <a:bodyPr rtlCol="0" anchor="ctr"/>
-          <a:lstStyle/>
-          <a:p>
-            <a:pPr algn="ctr"/>
-            <a:endParaRPr lang="en-US"/>
-          </a:p>
-        </p:txBody>
-      </p:sp>
-      <p:sp>
-        <p:nvSpPr>
-          <p:cNvPr id="18" name="Rectangle: Rounded Corners 17">
-            <a:extLst>
-              <a:ext uri="{FF2B5EF4-FFF2-40B4-BE49-F238E27FC236}">
-                <a16:creationId xmlns:a16="http://schemas.microsoft.com/office/drawing/2014/main" id="{2DF384E1-0158-4B13-ABA0-76C66C401D0B}"/>
-              </a:ext>
-            </a:extLst>
-          </p:cNvPr>
-          <p:cNvSpPr/>
-          <p:nvPr/>
-        </p:nvSpPr>
-        <p:spPr>
-          <a:xfrm>
-            <a:off x="1828028" y="212042"/>
-            <a:ext cx="1139351" cy="1229640"/>
-          </a:xfrm>
-          <a:prstGeom prst="roundRect">
-            <a:avLst>
-              <a:gd name="adj" fmla="val 3639"/>
-            </a:avLst>
-          </a:prstGeom>
-          <a:noFill/>
-          <a:ln w="19050">
-            <a:solidFill>
-              <a:srgbClr val="C00000"/>
-            </a:solidFill>
-          </a:ln>
-        </p:spPr>
-        <p:style>
-          <a:lnRef idx="2">
-            <a:schemeClr val="accent1">
-              <a:shade val="50000"/>
-            </a:schemeClr>
-          </a:lnRef>
-          <a:fillRef idx="1">
-            <a:schemeClr val="accent1"/>
-          </a:fillRef>
-          <a:effectRef idx="0">
-            <a:schemeClr val="accent1"/>
-          </a:effectRef>
-          <a:fontRef idx="minor">
-            <a:schemeClr val="lt1"/>
-          </a:fontRef>
-        </p:style>
-        <p:txBody>
-          <a:bodyPr rtlCol="0" anchor="ctr"/>
-          <a:lstStyle/>
-          <a:p>
-            <a:pPr algn="ctr"/>
-            <a:endParaRPr lang="en-US"/>
-          </a:p>
-        </p:txBody>
-      </p:sp>
-    </p:spTree>
-    <p:extLst>
-      <p:ext uri="{BB962C8B-B14F-4D97-AF65-F5344CB8AC3E}">
-        <p14:creationId xmlns:p14="http://schemas.microsoft.com/office/powerpoint/2010/main" val="2921291968"/>
-      </p:ext>
-    </p:extLst>
-  </p:cSld>
-  <p:clrMapOvr>
-    <a:masterClrMapping/>
-  </p:clrMapOvr>
-</p:sld>
-</file>
-
-<file path=ppt/slides/slide4.xml><?xml version="1.0" encoding="utf-8"?>
-<p:sld xmlns:a="http://schemas.openxmlformats.org/drawingml/2006/main" xmlns:r="http://schemas.openxmlformats.org/officeDocument/2006/relationships" xmlns:p="http://schemas.openxmlformats.org/presentationml/2006/main">
-  <p:cSld>
-    <p:bg>
-      <p:bgPr>
-        <a:solidFill>
-          <a:schemeClr val="tx1">
-            <a:lumMod val="85000"/>
-            <a:lumOff val="15000"/>
-          </a:schemeClr>
-        </a:solidFill>
-        <a:effectLst/>
-      </p:bgPr>
-    </p:bg>
-    <p:spTree>
-      <p:nvGrpSpPr>
-        <p:cNvPr id="1" name=""/>
-        <p:cNvGrpSpPr/>
-        <p:nvPr/>
-      </p:nvGrpSpPr>
-      <p:grpSpPr>
-        <a:xfrm>
-          <a:off x="0" y="0"/>
-          <a:ext cx="0" cy="0"/>
-          <a:chOff x="0" y="0"/>
-          <a:chExt cx="0" cy="0"/>
-        </a:xfrm>
-      </p:grpSpPr>
-      <p:sp>
-        <p:nvSpPr>
-          <p:cNvPr id="4" name="TextBox 3">
-            <a:extLst>
-              <a:ext uri="{FF2B5EF4-FFF2-40B4-BE49-F238E27FC236}">
-                <a16:creationId xmlns:a16="http://schemas.microsoft.com/office/drawing/2014/main" id="{81607AD8-2865-49DA-9B6C-725094F527FC}"/>
-              </a:ext>
-            </a:extLst>
-          </p:cNvPr>
-          <p:cNvSpPr txBox="1"/>
-          <p:nvPr/>
-        </p:nvSpPr>
-        <p:spPr>
-          <a:xfrm>
-            <a:off x="3653683" y="650238"/>
-            <a:ext cx="4884633" cy="679476"/>
-          </a:xfrm>
-          <a:prstGeom prst="rect">
-            <a:avLst/>
-          </a:prstGeom>
-          <a:noFill/>
-        </p:spPr>
-        <p:txBody>
-          <a:bodyPr wrap="square" rtlCol="0">
-            <a:prstTxWarp prst="textDeflateBottom">
-              <a:avLst>
-                <a:gd name="adj" fmla="val 76247"/>
-              </a:avLst>
-            </a:prstTxWarp>
-            <a:spAutoFit/>
-          </a:bodyPr>
-          <a:lstStyle/>
-          <a:p>
-            <a:pPr algn="ctr"/>
-            <a:r>
-              <a:rPr lang="en-US" sz="3200" dirty="0">
-                <a:solidFill>
-                  <a:srgbClr val="C00000"/>
-                </a:solidFill>
-                <a:latin typeface="Bebas Neue" panose="020B0606020202050201" pitchFamily="34" charset="0"/>
-              </a:rPr>
-              <a:t>Netflix</a:t>
-            </a:r>
-          </a:p>
-        </p:txBody>
-      </p:sp>
-      <p:sp>
-        <p:nvSpPr>
-          <p:cNvPr id="5" name="Rectangle: Rounded Corners 4">
-            <a:extLst>
-              <a:ext uri="{FF2B5EF4-FFF2-40B4-BE49-F238E27FC236}">
-                <a16:creationId xmlns:a16="http://schemas.microsoft.com/office/drawing/2014/main" id="{E3462CE3-2459-4615-9A26-BE8680C5B76D}"/>
-              </a:ext>
-            </a:extLst>
-          </p:cNvPr>
-          <p:cNvSpPr/>
-          <p:nvPr/>
-        </p:nvSpPr>
-        <p:spPr>
-          <a:xfrm>
-            <a:off x="408435" y="148202"/>
-            <a:ext cx="1139351" cy="1293480"/>
-          </a:xfrm>
-          <a:prstGeom prst="roundRect">
-            <a:avLst>
-              <a:gd name="adj" fmla="val 3639"/>
-            </a:avLst>
-          </a:prstGeom>
-          <a:noFill/>
-          <a:ln w="19050">
-            <a:solidFill>
-              <a:srgbClr val="C00000"/>
-            </a:solidFill>
-          </a:ln>
-        </p:spPr>
-        <p:style>
-          <a:lnRef idx="2">
-            <a:schemeClr val="accent1">
-              <a:shade val="50000"/>
-            </a:schemeClr>
-          </a:lnRef>
-          <a:fillRef idx="1">
-            <a:schemeClr val="accent1"/>
-          </a:fillRef>
-          <a:effectRef idx="0">
-            <a:schemeClr val="accent1"/>
-          </a:effectRef>
-          <a:fontRef idx="minor">
-            <a:schemeClr val="lt1"/>
-          </a:fontRef>
-        </p:style>
-        <p:txBody>
-          <a:bodyPr rtlCol="0" anchor="ctr"/>
-          <a:lstStyle/>
-          <a:p>
-            <a:pPr algn="ctr"/>
-            <a:endParaRPr lang="en-US"/>
-          </a:p>
-        </p:txBody>
-      </p:sp>
-      <p:sp>
-        <p:nvSpPr>
-          <p:cNvPr id="7" name="Rectangle: Rounded Corners 6">
-            <a:extLst>
-              <a:ext uri="{FF2B5EF4-FFF2-40B4-BE49-F238E27FC236}">
-                <a16:creationId xmlns:a16="http://schemas.microsoft.com/office/drawing/2014/main" id="{D27DD9B1-2189-435B-B411-220C58C6CF08}"/>
-              </a:ext>
-            </a:extLst>
-          </p:cNvPr>
-          <p:cNvSpPr/>
-          <p:nvPr/>
-        </p:nvSpPr>
-        <p:spPr>
-          <a:xfrm>
-            <a:off x="408441" y="4525204"/>
-            <a:ext cx="4885012" cy="2184594"/>
+            <a:off x="408434" y="1207906"/>
+            <a:ext cx="3157725" cy="979286"/>
           </a:xfrm>
           <a:prstGeom prst="roundRect">
             <a:avLst>
@@ -4222,16 +4295,16 @@
           <a:lstStyle/>
           <a:p>
             <a:pPr algn="ctr"/>
-            <a:endParaRPr lang="en-US"/>
-          </a:p>
-        </p:txBody>
-      </p:sp>
-      <p:sp>
-        <p:nvSpPr>
-          <p:cNvPr id="8" name="Rectangle: Rounded Corners 7">
-            <a:extLst>
-              <a:ext uri="{FF2B5EF4-FFF2-40B4-BE49-F238E27FC236}">
-                <a16:creationId xmlns:a16="http://schemas.microsoft.com/office/drawing/2014/main" id="{BCB273F6-D7A6-427F-AA82-E0049A7D0C8B}"/>
+            <a:endParaRPr lang="en-US" dirty="0"/>
+          </a:p>
+        </p:txBody>
+      </p:sp>
+      <p:sp>
+        <p:nvSpPr>
+          <p:cNvPr id="9" name="Rectangle: Rounded Corners 11">
+            <a:extLst>
+              <a:ext uri="{FF2B5EF4-FFF2-40B4-BE49-F238E27FC236}">
+                <a16:creationId xmlns:a16="http://schemas.microsoft.com/office/drawing/2014/main" id="{9601BE81-879B-0807-496E-6E8C34D1E760}"/>
               </a:ext>
             </a:extLst>
           </p:cNvPr>
@@ -4240,111 +4313,8 @@
         </p:nvSpPr>
         <p:spPr>
           <a:xfrm>
-            <a:off x="5444455" y="4519292"/>
-            <a:ext cx="6442746" cy="2184594"/>
-          </a:xfrm>
-          <a:prstGeom prst="roundRect">
-            <a:avLst>
-              <a:gd name="adj" fmla="val 3639"/>
-            </a:avLst>
-          </a:prstGeom>
-          <a:noFill/>
-          <a:ln w="19050">
-            <a:solidFill>
-              <a:srgbClr val="C00000"/>
-            </a:solidFill>
-          </a:ln>
-        </p:spPr>
-        <p:style>
-          <a:lnRef idx="2">
-            <a:schemeClr val="accent1">
-              <a:shade val="50000"/>
-            </a:schemeClr>
-          </a:lnRef>
-          <a:fillRef idx="1">
-            <a:schemeClr val="accent1"/>
-          </a:fillRef>
-          <a:effectRef idx="0">
-            <a:schemeClr val="accent1"/>
-          </a:effectRef>
-          <a:fontRef idx="minor">
-            <a:schemeClr val="lt1"/>
-          </a:fontRef>
-        </p:style>
-        <p:txBody>
-          <a:bodyPr rtlCol="0" anchor="ctr"/>
-          <a:lstStyle/>
-          <a:p>
-            <a:pPr algn="ctr"/>
-            <a:endParaRPr lang="en-US"/>
-          </a:p>
-        </p:txBody>
-      </p:sp>
-      <p:sp>
-        <p:nvSpPr>
-          <p:cNvPr id="2" name="TextBox 1">
-            <a:extLst>
-              <a:ext uri="{FF2B5EF4-FFF2-40B4-BE49-F238E27FC236}">
-                <a16:creationId xmlns:a16="http://schemas.microsoft.com/office/drawing/2014/main" id="{D6CEE3BC-0FA4-476B-ADDB-083D4277EA5A}"/>
-              </a:ext>
-            </a:extLst>
-          </p:cNvPr>
-          <p:cNvSpPr txBox="1"/>
-          <p:nvPr/>
-        </p:nvSpPr>
-        <p:spPr>
-          <a:xfrm>
-            <a:off x="5287123" y="234898"/>
-            <a:ext cx="1617751" cy="369332"/>
-          </a:xfrm>
-          <a:prstGeom prst="rect">
-            <a:avLst/>
-          </a:prstGeom>
-          <a:noFill/>
-        </p:spPr>
-        <p:txBody>
-          <a:bodyPr wrap="none" rtlCol="0">
-            <a:spAutoFit/>
-          </a:bodyPr>
-          <a:lstStyle/>
-          <a:p>
-            <a:r>
-              <a:rPr lang="en-US" dirty="0" err="1">
-                <a:solidFill>
-                  <a:schemeClr val="bg1"/>
-                </a:solidFill>
-                <a:latin typeface="Bebas Neue" panose="020B0606020202050201" pitchFamily="34" charset="0"/>
-              </a:rPr>
-              <a:t>Películas</a:t>
-            </a:r>
-            <a:r>
-              <a:rPr lang="en-US" dirty="0">
-                <a:solidFill>
-                  <a:schemeClr val="bg1"/>
-                </a:solidFill>
-                <a:latin typeface="Bebas Neue" panose="020B0606020202050201" pitchFamily="34" charset="0"/>
-              </a:rPr>
-              <a:t> top IMDB</a:t>
-            </a:r>
-          </a:p>
-        </p:txBody>
-      </p:sp>
-      <p:sp>
-        <p:nvSpPr>
-          <p:cNvPr id="12" name="Rectangle: Rounded Corners 11">
-            <a:extLst>
-              <a:ext uri="{FF2B5EF4-FFF2-40B4-BE49-F238E27FC236}">
-                <a16:creationId xmlns:a16="http://schemas.microsoft.com/office/drawing/2014/main" id="{31844B8E-71A6-4C58-B758-27C740BFEF6D}"/>
-              </a:ext>
-            </a:extLst>
-          </p:cNvPr>
-          <p:cNvSpPr/>
-          <p:nvPr/>
-        </p:nvSpPr>
-        <p:spPr>
-          <a:xfrm>
-            <a:off x="408435" y="1610687"/>
-            <a:ext cx="11478766" cy="2796638"/>
+            <a:off x="408434" y="2344401"/>
+            <a:ext cx="3157725" cy="1456107"/>
           </a:xfrm>
           <a:prstGeom prst="roundRect">
             <a:avLst>
@@ -4380,114 +4350,6 @@
           <a:p>
             <a:pPr algn="ctr"/>
             <a:endParaRPr lang="en-US" dirty="0"/>
-          </a:p>
-        </p:txBody>
-      </p:sp>
-      <p:sp>
-        <p:nvSpPr>
-          <p:cNvPr id="17" name="Rectangle: Rounded Corners 16">
-            <a:extLst>
-              <a:ext uri="{FF2B5EF4-FFF2-40B4-BE49-F238E27FC236}">
-                <a16:creationId xmlns:a16="http://schemas.microsoft.com/office/drawing/2014/main" id="{3FD6F48E-DE54-4F7C-8972-2537AF525580}"/>
-              </a:ext>
-            </a:extLst>
-          </p:cNvPr>
-          <p:cNvSpPr/>
-          <p:nvPr/>
-        </p:nvSpPr>
-        <p:spPr>
-          <a:xfrm>
-            <a:off x="9224618" y="212042"/>
-            <a:ext cx="2533031" cy="1229640"/>
-          </a:xfrm>
-          <a:prstGeom prst="roundRect">
-            <a:avLst>
-              <a:gd name="adj" fmla="val 3639"/>
-            </a:avLst>
-          </a:prstGeom>
-          <a:noFill/>
-          <a:ln w="19050">
-            <a:solidFill>
-              <a:srgbClr val="C00000"/>
-            </a:solidFill>
-          </a:ln>
-        </p:spPr>
-        <p:style>
-          <a:lnRef idx="2">
-            <a:schemeClr val="accent1">
-              <a:shade val="50000"/>
-            </a:schemeClr>
-          </a:lnRef>
-          <a:fillRef idx="1">
-            <a:schemeClr val="accent1"/>
-          </a:fillRef>
-          <a:effectRef idx="0">
-            <a:schemeClr val="accent1"/>
-          </a:effectRef>
-          <a:fontRef idx="minor">
-            <a:schemeClr val="lt1"/>
-          </a:fontRef>
-        </p:style>
-        <p:txBody>
-          <a:bodyPr rtlCol="0" anchor="ctr"/>
-          <a:lstStyle/>
-          <a:p>
-            <a:pPr algn="ctr"/>
-            <a:endParaRPr lang="en-US"/>
-          </a:p>
-        </p:txBody>
-      </p:sp>
-      <p:sp>
-        <p:nvSpPr>
-          <p:cNvPr id="18" name="Rectangle: Rounded Corners 17">
-            <a:extLst>
-              <a:ext uri="{FF2B5EF4-FFF2-40B4-BE49-F238E27FC236}">
-                <a16:creationId xmlns:a16="http://schemas.microsoft.com/office/drawing/2014/main" id="{2DF384E1-0158-4B13-ABA0-76C66C401D0B}"/>
-              </a:ext>
-            </a:extLst>
-          </p:cNvPr>
-          <p:cNvSpPr/>
-          <p:nvPr/>
-        </p:nvSpPr>
-        <p:spPr>
-          <a:xfrm>
-            <a:off x="1828028" y="212042"/>
-            <a:ext cx="1139351" cy="1229640"/>
-          </a:xfrm>
-          <a:prstGeom prst="roundRect">
-            <a:avLst>
-              <a:gd name="adj" fmla="val 3639"/>
-            </a:avLst>
-          </a:prstGeom>
-          <a:noFill/>
-          <a:ln w="19050">
-            <a:solidFill>
-              <a:srgbClr val="C00000"/>
-            </a:solidFill>
-          </a:ln>
-        </p:spPr>
-        <p:style>
-          <a:lnRef idx="2">
-            <a:schemeClr val="accent1">
-              <a:shade val="50000"/>
-            </a:schemeClr>
-          </a:lnRef>
-          <a:fillRef idx="1">
-            <a:schemeClr val="accent1"/>
-          </a:fillRef>
-          <a:effectRef idx="0">
-            <a:schemeClr val="accent1"/>
-          </a:effectRef>
-          <a:fontRef idx="minor">
-            <a:schemeClr val="lt1"/>
-          </a:fontRef>
-        </p:style>
-        <p:txBody>
-          <a:bodyPr rtlCol="0" anchor="ctr"/>
-          <a:lstStyle/>
-          <a:p>
-            <a:pPr algn="ctr"/>
-            <a:endParaRPr lang="en-US"/>
           </a:p>
         </p:txBody>
       </p:sp>

</xml_diff>